<commit_message>
actualizacion de la presentacion pruebas agiles
Se han añadido imagenes
</commit_message>
<xml_diff>
--- a/PruebasAgilesV2.pptx
+++ b/PruebasAgilesV2.pptx
@@ -124,6 +124,90 @@
     </p:ext>
   </p:extLst>
 </p:presentation>
+</file>
+
+<file path=ppt/revisionInfo.xml><?xml version="1.0" encoding="utf-8"?>
+<p1510:revInfo xmlns:a="http://schemas.openxmlformats.org/drawingml/2006/main" xmlns:r="http://schemas.openxmlformats.org/officeDocument/2006/relationships" xmlns:p1510="http://schemas.microsoft.com/office/powerpoint/2015/10/main">
+  <p1510:revLst>
+    <p1510:client id="{A43172CC-68EB-FC2D-C5CC-36857503AC0D}" v="33" dt="2022-01-10T09:25:09.753"/>
+  </p1510:revLst>
+</p1510:revInfo>
+</file>
+
+<file path=ppt/changesInfos/changesInfo1.xml><?xml version="1.0" encoding="utf-8"?>
+<pc:chgInfo xmlns:a="http://schemas.openxmlformats.org/drawingml/2006/main" xmlns:r="http://schemas.openxmlformats.org/officeDocument/2006/relationships" xmlns:ac="http://schemas.microsoft.com/office/drawing/2013/main/command" xmlns:pc="http://schemas.microsoft.com/office/powerpoint/2013/main/command">
+  <pc:docChgLst>
+    <pc:chgData name="Alejandro Marín Bermúdez" userId="S::alejandro.ma35071@cesurformacion.com::2150fb69-652c-406e-9595-f3075b67d4f2" providerId="AD" clId="Web-{A43172CC-68EB-FC2D-C5CC-36857503AC0D}"/>
+    <pc:docChg chg="modSld">
+      <pc:chgData name="Alejandro Marín Bermúdez" userId="S::alejandro.ma35071@cesurformacion.com::2150fb69-652c-406e-9595-f3075b67d4f2" providerId="AD" clId="Web-{A43172CC-68EB-FC2D-C5CC-36857503AC0D}" dt="2022-01-10T09:25:09.753" v="28" actId="1076"/>
+      <pc:docMkLst>
+        <pc:docMk/>
+      </pc:docMkLst>
+      <pc:sldChg chg="addSp delSp modSp">
+        <pc:chgData name="Alejandro Marín Bermúdez" userId="S::alejandro.ma35071@cesurformacion.com::2150fb69-652c-406e-9595-f3075b67d4f2" providerId="AD" clId="Web-{A43172CC-68EB-FC2D-C5CC-36857503AC0D}" dt="2022-01-10T09:23:01.391" v="14" actId="14100"/>
+        <pc:sldMkLst>
+          <pc:docMk/>
+          <pc:sldMk cId="744374543" sldId="259"/>
+        </pc:sldMkLst>
+        <pc:picChg chg="add del mod">
+          <ac:chgData name="Alejandro Marín Bermúdez" userId="S::alejandro.ma35071@cesurformacion.com::2150fb69-652c-406e-9595-f3075b67d4f2" providerId="AD" clId="Web-{A43172CC-68EB-FC2D-C5CC-36857503AC0D}" dt="2022-01-10T09:18:43.165" v="6"/>
+          <ac:picMkLst>
+            <pc:docMk/>
+            <pc:sldMk cId="744374543" sldId="259"/>
+            <ac:picMk id="4" creationId="{5DDC702E-CC98-4EC7-A7C8-AF69A3D2DE26}"/>
+          </ac:picMkLst>
+        </pc:picChg>
+        <pc:picChg chg="add del mod">
+          <ac:chgData name="Alejandro Marín Bermúdez" userId="S::alejandro.ma35071@cesurformacion.com::2150fb69-652c-406e-9595-f3075b67d4f2" providerId="AD" clId="Web-{A43172CC-68EB-FC2D-C5CC-36857503AC0D}" dt="2022-01-10T09:20:39.715" v="9"/>
+          <ac:picMkLst>
+            <pc:docMk/>
+            <pc:sldMk cId="744374543" sldId="259"/>
+            <ac:picMk id="5" creationId="{6FE73987-6B89-48DF-8F82-0C161154647C}"/>
+          </ac:picMkLst>
+        </pc:picChg>
+        <pc:picChg chg="add mod">
+          <ac:chgData name="Alejandro Marín Bermúdez" userId="S::alejandro.ma35071@cesurformacion.com::2150fb69-652c-406e-9595-f3075b67d4f2" providerId="AD" clId="Web-{A43172CC-68EB-FC2D-C5CC-36857503AC0D}" dt="2022-01-10T09:23:01.391" v="14" actId="14100"/>
+          <ac:picMkLst>
+            <pc:docMk/>
+            <pc:sldMk cId="744374543" sldId="259"/>
+            <ac:picMk id="6" creationId="{F737D987-B9F7-4E3D-9708-539D0D72B1A5}"/>
+          </ac:picMkLst>
+        </pc:picChg>
+      </pc:sldChg>
+      <pc:sldChg chg="addSp modSp">
+        <pc:chgData name="Alejandro Marín Bermúdez" userId="S::alejandro.ma35071@cesurformacion.com::2150fb69-652c-406e-9595-f3075b67d4f2" providerId="AD" clId="Web-{A43172CC-68EB-FC2D-C5CC-36857503AC0D}" dt="2022-01-10T09:25:09.753" v="28" actId="1076"/>
+        <pc:sldMkLst>
+          <pc:docMk/>
+          <pc:sldMk cId="421118389" sldId="266"/>
+        </pc:sldMkLst>
+        <pc:spChg chg="mod">
+          <ac:chgData name="Alejandro Marín Bermúdez" userId="S::alejandro.ma35071@cesurformacion.com::2150fb69-652c-406e-9595-f3075b67d4f2" providerId="AD" clId="Web-{A43172CC-68EB-FC2D-C5CC-36857503AC0D}" dt="2022-01-10T09:24:34.049" v="17" actId="1076"/>
+          <ac:spMkLst>
+            <pc:docMk/>
+            <pc:sldMk cId="421118389" sldId="266"/>
+            <ac:spMk id="2" creationId="{FAE58556-B67A-40E8-B4BB-CCF89FF0E7F6}"/>
+          </ac:spMkLst>
+        </pc:spChg>
+        <pc:spChg chg="mod">
+          <ac:chgData name="Alejandro Marín Bermúdez" userId="S::alejandro.ma35071@cesurformacion.com::2150fb69-652c-406e-9595-f3075b67d4f2" providerId="AD" clId="Web-{A43172CC-68EB-FC2D-C5CC-36857503AC0D}" dt="2022-01-10T09:25:09.753" v="28" actId="1076"/>
+          <ac:spMkLst>
+            <pc:docMk/>
+            <pc:sldMk cId="421118389" sldId="266"/>
+            <ac:spMk id="3" creationId="{35B27167-8655-4D3C-BF16-8A79AF6B1E0B}"/>
+          </ac:spMkLst>
+        </pc:spChg>
+        <pc:picChg chg="add mod">
+          <ac:chgData name="Alejandro Marín Bermúdez" userId="S::alejandro.ma35071@cesurformacion.com::2150fb69-652c-406e-9595-f3075b67d4f2" providerId="AD" clId="Web-{A43172CC-68EB-FC2D-C5CC-36857503AC0D}" dt="2022-01-10T09:24:58.190" v="26" actId="1076"/>
+          <ac:picMkLst>
+            <pc:docMk/>
+            <pc:sldMk cId="421118389" sldId="266"/>
+            <ac:picMk id="4" creationId="{FE3234DB-9DAA-4864-8F9F-1EE1F03DFB46}"/>
+          </ac:picMkLst>
+        </pc:picChg>
+      </pc:sldChg>
+    </pc:docChg>
+  </pc:docChgLst>
+</pc:chgInfo>
 </file>
 
 <file path=ppt/diagrams/colors1.xml><?xml version="1.0" encoding="utf-8"?>
@@ -2730,7 +2814,7 @@
           <a:p>
             <a:fld id="{6B7C8C16-475A-4026-8EBF-119E719DCF1D}" type="datetimeFigureOut">
               <a:rPr lang="es-ES" smtClean="0"/>
-              <a:t>07/01/2022</a:t>
+              <a:t>10/01/2022</a:t>
             </a:fld>
             <a:endParaRPr lang="es-ES"/>
           </a:p>
@@ -2908,7 +2992,7 @@
           <a:p>
             <a:fld id="{2DBBC163-38E5-48C0-A1A8-F3A58B029681}" type="datetimeFigureOut">
               <a:rPr lang="es-ES" noProof="0" smtClean="0"/>
-              <a:t>07/01/2022</a:t>
+              <a:t>10/01/2022</a:t>
             </a:fld>
             <a:endParaRPr lang="es-ES" noProof="0"/>
           </a:p>
@@ -3445,7 +3529,7 @@
           <a:p>
             <a:fld id="{88D38747-4367-4BD2-8D51-C97E202738E2}" type="datetime1">
               <a:rPr lang="en-US" smtClean="0"/>
-              <a:t>1/7/2022</a:t>
+              <a:t>1/10/2022</a:t>
             </a:fld>
             <a:endParaRPr lang="en-US" dirty="0"/>
           </a:p>
@@ -3750,7 +3834,7 @@
           <a:p>
             <a:fld id="{11F1B079-7EF0-44EE-B798-BCC497C9F3B2}" type="datetime1">
               <a:rPr lang="en-US" smtClean="0"/>
-              <a:t>1/7/2022</a:t>
+              <a:t>1/10/2022</a:t>
             </a:fld>
             <a:endParaRPr lang="en-US" dirty="0"/>
           </a:p>
@@ -3944,7 +4028,7 @@
           <a:p>
             <a:fld id="{28FF70A8-1D13-4657-95F0-A9EA54967B8D}" type="datetime1">
               <a:rPr lang="en-US" smtClean="0"/>
-              <a:t>1/7/2022</a:t>
+              <a:t>1/10/2022</a:t>
             </a:fld>
             <a:endParaRPr lang="en-US" dirty="0"/>
           </a:p>
@@ -4207,7 +4291,7 @@
           <a:p>
             <a:fld id="{21EB90AC-71BD-4C7F-8ACA-7B3F18292E63}" type="datetime1">
               <a:rPr lang="en-US" smtClean="0"/>
-              <a:t>1/7/2022</a:t>
+              <a:t>1/10/2022</a:t>
             </a:fld>
             <a:endParaRPr lang="en-US" dirty="0"/>
           </a:p>
@@ -4643,7 +4727,7 @@
           <a:p>
             <a:fld id="{4E6EFC2C-8905-46F0-B443-CE905B76BA01}" type="datetime1">
               <a:rPr lang="en-US" smtClean="0"/>
-              <a:t>1/7/2022</a:t>
+              <a:t>1/10/2022</a:t>
             </a:fld>
             <a:endParaRPr lang="en-US" dirty="0"/>
           </a:p>
@@ -5180,7 +5264,7 @@
           <a:p>
             <a:fld id="{D9079DC3-C9B5-499E-9140-0DC28B7074E2}" type="datetime1">
               <a:rPr lang="en-US" smtClean="0"/>
-              <a:t>1/7/2022</a:t>
+              <a:t>1/10/2022</a:t>
             </a:fld>
             <a:endParaRPr lang="en-US" dirty="0"/>
           </a:p>
@@ -6062,7 +6146,7 @@
           <a:p>
             <a:fld id="{30BB33EA-E472-4D22-9C03-A9C14AA21CED}" type="datetime1">
               <a:rPr lang="en-US" smtClean="0"/>
-              <a:t>1/7/2022</a:t>
+              <a:t>1/10/2022</a:t>
             </a:fld>
             <a:endParaRPr lang="en-US" dirty="0"/>
           </a:p>
@@ -6232,7 +6316,7 @@
           <a:p>
             <a:fld id="{217E833E-1B6D-415F-AD29-75AE8C43BD0D}" type="datetime1">
               <a:rPr lang="en-US" smtClean="0"/>
-              <a:t>1/7/2022</a:t>
+              <a:t>1/10/2022</a:t>
             </a:fld>
             <a:endParaRPr lang="en-US" dirty="0"/>
           </a:p>
@@ -6416,7 +6500,7 @@
           <a:p>
             <a:fld id="{8452596F-08A7-4B70-989A-F2B1CF31E66B}" type="datetime1">
               <a:rPr lang="en-US" smtClean="0"/>
-              <a:t>1/7/2022</a:t>
+              <a:t>1/10/2022</a:t>
             </a:fld>
             <a:endParaRPr lang="en-US" dirty="0"/>
           </a:p>
@@ -6586,7 +6670,7 @@
           <a:p>
             <a:fld id="{73C55A3C-5767-4844-A0A3-83778C2E5409}" type="datetime1">
               <a:rPr lang="en-US" smtClean="0"/>
-              <a:t>1/7/2022</a:t>
+              <a:t>1/10/2022</a:t>
             </a:fld>
             <a:endParaRPr lang="en-US" dirty="0"/>
           </a:p>
@@ -6830,7 +6914,7 @@
           <a:p>
             <a:fld id="{CAE507A8-A5CF-4D38-AB86-7EDDA87A85D4}" type="datetime1">
               <a:rPr lang="en-US" smtClean="0"/>
-              <a:t>1/7/2022</a:t>
+              <a:t>1/10/2022</a:t>
             </a:fld>
             <a:endParaRPr lang="en-US" dirty="0"/>
           </a:p>
@@ -7072,7 +7156,7 @@
           <a:p>
             <a:fld id="{BDFCD27C-8599-43EF-BA1D-14DDC1946E06}" type="datetime1">
               <a:rPr lang="en-US" smtClean="0"/>
-              <a:t>1/7/2022</a:t>
+              <a:t>1/10/2022</a:t>
             </a:fld>
             <a:endParaRPr lang="en-US" dirty="0"/>
           </a:p>
@@ -7553,7 +7637,7 @@
           <a:p>
             <a:fld id="{49343D99-809A-49C0-96E5-4250D0B498EE}" type="datetime1">
               <a:rPr lang="en-US" smtClean="0"/>
-              <a:t>1/7/2022</a:t>
+              <a:t>1/10/2022</a:t>
             </a:fld>
             <a:endParaRPr lang="en-US" dirty="0"/>
           </a:p>
@@ -7671,7 +7755,7 @@
           <a:p>
             <a:fld id="{A143DE9B-B678-4EFB-BB7D-A4370204A0B0}" type="datetime1">
               <a:rPr lang="en-US" smtClean="0"/>
-              <a:t>1/7/2022</a:t>
+              <a:t>1/10/2022</a:t>
             </a:fld>
             <a:endParaRPr lang="en-US" dirty="0"/>
           </a:p>
@@ -7766,7 +7850,7 @@
           <a:p>
             <a:fld id="{E68812DA-F765-4142-A6A3-A8ED7235E082}" type="datetime1">
               <a:rPr lang="en-US" smtClean="0"/>
-              <a:t>1/7/2022</a:t>
+              <a:t>1/10/2022</a:t>
             </a:fld>
             <a:endParaRPr lang="en-US" dirty="0"/>
           </a:p>
@@ -8021,7 +8105,7 @@
           <a:p>
             <a:fld id="{3E0277FD-7DE6-41D4-930D-AC99F5AFE54E}" type="datetime1">
               <a:rPr lang="en-US" smtClean="0"/>
-              <a:t>1/7/2022</a:t>
+              <a:t>1/10/2022</a:t>
             </a:fld>
             <a:endParaRPr lang="en-US" dirty="0"/>
           </a:p>
@@ -8328,7 +8412,7 @@
           <a:p>
             <a:fld id="{9EA15526-7079-4B7B-987C-1B5FAE11A0FF}" type="datetime1">
               <a:rPr lang="en-US" smtClean="0"/>
-              <a:t>1/7/2022</a:t>
+              <a:t>1/10/2022</a:t>
             </a:fld>
             <a:endParaRPr lang="en-US" dirty="0"/>
           </a:p>
@@ -8563,7 +8647,7 @@
           <a:p>
             <a:fld id="{073ED0CC-082F-4160-86E5-0D6041F12778}" type="datetime1">
               <a:rPr lang="en-US" smtClean="0"/>
-              <a:t>1/7/2022</a:t>
+              <a:t>1/10/2022</a:t>
             </a:fld>
             <a:endParaRPr lang="en-US" dirty="0"/>
           </a:p>
@@ -10236,6 +10320,36 @@
           </a:p>
         </p:txBody>
       </p:sp>
+      <p:pic>
+        <p:nvPicPr>
+          <p:cNvPr id="6" name="Imagen 6" descr="Imagen que contiene firmar, refrigerador, hombre&#10;&#10;Descripción generada automáticamente">
+            <a:extLst>
+              <a:ext uri="{FF2B5EF4-FFF2-40B4-BE49-F238E27FC236}">
+                <a16:creationId xmlns:a16="http://schemas.microsoft.com/office/drawing/2014/main" id="{F737D987-B9F7-4E3D-9708-539D0D72B1A5}"/>
+              </a:ext>
+            </a:extLst>
+          </p:cNvPr>
+          <p:cNvPicPr>
+            <a:picLocks noChangeAspect="1"/>
+          </p:cNvPicPr>
+          <p:nvPr/>
+        </p:nvPicPr>
+        <p:blipFill>
+          <a:blip r:embed="rId3"/>
+          <a:stretch>
+            <a:fillRect/>
+          </a:stretch>
+        </p:blipFill>
+        <p:spPr>
+          <a:xfrm>
+            <a:off x="655864" y="4210897"/>
+            <a:ext cx="4199164" cy="2055707"/>
+          </a:xfrm>
+          <a:prstGeom prst="rect">
+            <a:avLst/>
+          </a:prstGeom>
+        </p:spPr>
+      </p:pic>
     </p:spTree>
     <p:extLst>
       <p:ext uri="{BB962C8B-B14F-4D97-AF65-F5344CB8AC3E}">
@@ -10437,7 +10551,7 @@
         </p:nvSpPr>
         <p:spPr>
           <a:xfrm>
-            <a:off x="538015" y="733863"/>
+            <a:off x="660479" y="-735708"/>
             <a:ext cx="4262731" cy="5276541"/>
           </a:xfrm>
         </p:spPr>
@@ -10541,7 +10655,7 @@
         </p:nvSpPr>
         <p:spPr>
           <a:xfrm>
-            <a:off x="5036368" y="827808"/>
+            <a:off x="5049975" y="841415"/>
             <a:ext cx="6815736" cy="5182595"/>
           </a:xfrm>
           <a:effectLst/>
@@ -10603,6 +10717,36 @@
           </a:p>
         </p:txBody>
       </p:sp>
+      <p:pic>
+        <p:nvPicPr>
+          <p:cNvPr id="4" name="Imagen 4" descr="Gráfico, Diagrama, Gráfico de embudo&#10;&#10;Descripción generada automáticamente">
+            <a:extLst>
+              <a:ext uri="{FF2B5EF4-FFF2-40B4-BE49-F238E27FC236}">
+                <a16:creationId xmlns:a16="http://schemas.microsoft.com/office/drawing/2014/main" id="{FE3234DB-9DAA-4864-8F9F-1EE1F03DFB46}"/>
+              </a:ext>
+            </a:extLst>
+          </p:cNvPr>
+          <p:cNvPicPr>
+            <a:picLocks noChangeAspect="1"/>
+          </p:cNvPicPr>
+          <p:nvPr/>
+        </p:nvPicPr>
+        <p:blipFill>
+          <a:blip r:embed="rId3"/>
+          <a:stretch>
+            <a:fillRect/>
+          </a:stretch>
+        </p:blipFill>
+        <p:spPr>
+          <a:xfrm>
+            <a:off x="1322614" y="2806510"/>
+            <a:ext cx="3858986" cy="3707875"/>
+          </a:xfrm>
+          <a:prstGeom prst="rect">
+            <a:avLst/>
+          </a:prstGeom>
+        </p:spPr>
+      </p:pic>
     </p:spTree>
     <p:extLst>
       <p:ext uri="{BB962C8B-B14F-4D97-AF65-F5344CB8AC3E}">

</xml_diff>